<commit_message>
Insert slide about the Fork-join model.
</commit_message>
<xml_diff>
--- a/lecture-3/presentation-3.pptx
+++ b/lecture-3/presentation-3.pptx
@@ -5,17 +5,18 @@
     <p:sldMasterId id="2147483764" r:id="rId1"/>
   </p:sldMasterIdLst>
   <p:notesMasterIdLst>
-    <p:notesMasterId r:id="rId10"/>
+    <p:notesMasterId r:id="rId11"/>
   </p:notesMasterIdLst>
   <p:sldIdLst>
     <p:sldId id="256" r:id="rId2"/>
     <p:sldId id="307" r:id="rId3"/>
     <p:sldId id="259" r:id="rId4"/>
     <p:sldId id="308" r:id="rId5"/>
-    <p:sldId id="309" r:id="rId6"/>
-    <p:sldId id="310" r:id="rId7"/>
-    <p:sldId id="311" r:id="rId8"/>
-    <p:sldId id="312" r:id="rId9"/>
+    <p:sldId id="313" r:id="rId6"/>
+    <p:sldId id="309" r:id="rId7"/>
+    <p:sldId id="310" r:id="rId8"/>
+    <p:sldId id="311" r:id="rId9"/>
+    <p:sldId id="312" r:id="rId10"/>
   </p:sldIdLst>
   <p:sldSz cx="12192000" cy="6858000"/>
   <p:notesSz cx="6858000" cy="9144000"/>
@@ -204,7 +205,7 @@
           <a:p>
             <a:fld id="{E758746B-B0EA-CA41-BB8E-A8C6FE44757D}" type="datetimeFigureOut">
               <a:rPr lang="en-US"/>
-              <a:t>10/11/19</a:t>
+              <a:t>10/20/19</a:t>
             </a:fld>
             <a:endParaRPr lang="en-US" dirty="0"/>
           </a:p>
@@ -619,7 +620,7 @@
             <a:fld id="{B61BEF0D-F0BB-DE4B-95CE-6DB70DBA9567}" type="datetimeFigureOut">
               <a:rPr lang="en-US"/>
               <a:pPr/>
-              <a:t>10/11/19</a:t>
+              <a:t>10/20/19</a:t>
             </a:fld>
             <a:endParaRPr lang="en-US" dirty="0"/>
           </a:p>
@@ -831,7 +832,7 @@
             <a:fld id="{B61BEF0D-F0BB-DE4B-95CE-6DB70DBA9567}" type="datetimeFigureOut">
               <a:rPr lang="en-US"/>
               <a:pPr/>
-              <a:t>10/11/19</a:t>
+              <a:t>10/20/19</a:t>
             </a:fld>
             <a:endParaRPr lang="en-US" dirty="0"/>
           </a:p>
@@ -1053,7 +1054,7 @@
             <a:fld id="{B61BEF0D-F0BB-DE4B-95CE-6DB70DBA9567}" type="datetimeFigureOut">
               <a:rPr lang="en-US"/>
               <a:pPr/>
-              <a:t>10/11/19</a:t>
+              <a:t>10/20/19</a:t>
             </a:fld>
             <a:endParaRPr lang="en-US" dirty="0"/>
           </a:p>
@@ -1265,7 +1266,7 @@
             <a:fld id="{B61BEF0D-F0BB-DE4B-95CE-6DB70DBA9567}" type="datetimeFigureOut">
               <a:rPr lang="en-US"/>
               <a:pPr/>
-              <a:t>10/11/19</a:t>
+              <a:t>10/20/19</a:t>
             </a:fld>
             <a:endParaRPr lang="en-US" dirty="0"/>
           </a:p>
@@ -1554,7 +1555,7 @@
             <a:fld id="{B61BEF0D-F0BB-DE4B-95CE-6DB70DBA9567}" type="datetimeFigureOut">
               <a:rPr lang="en-US"/>
               <a:pPr/>
-              <a:t>10/11/19</a:t>
+              <a:t>10/20/19</a:t>
             </a:fld>
             <a:endParaRPr lang="en-US" dirty="0"/>
           </a:p>
@@ -1833,7 +1834,7 @@
             <a:fld id="{B61BEF0D-F0BB-DE4B-95CE-6DB70DBA9567}" type="datetimeFigureOut">
               <a:rPr lang="en-US"/>
               <a:pPr/>
-              <a:t>10/11/19</a:t>
+              <a:t>10/20/19</a:t>
             </a:fld>
             <a:endParaRPr lang="en-US" dirty="0"/>
           </a:p>
@@ -2259,7 +2260,7 @@
             <a:fld id="{B61BEF0D-F0BB-DE4B-95CE-6DB70DBA9567}" type="datetimeFigureOut">
               <a:rPr lang="en-US"/>
               <a:pPr/>
-              <a:t>10/11/19</a:t>
+              <a:t>10/20/19</a:t>
             </a:fld>
             <a:endParaRPr lang="en-US" dirty="0"/>
           </a:p>
@@ -2402,7 +2403,7 @@
             <a:fld id="{B61BEF0D-F0BB-DE4B-95CE-6DB70DBA9567}" type="datetimeFigureOut">
               <a:rPr lang="en-US"/>
               <a:pPr/>
-              <a:t>10/11/19</a:t>
+              <a:t>10/20/19</a:t>
             </a:fld>
             <a:endParaRPr lang="en-US" dirty="0"/>
           </a:p>
@@ -2529,7 +2530,7 @@
             <a:fld id="{B61BEF0D-F0BB-DE4B-95CE-6DB70DBA9567}" type="datetimeFigureOut">
               <a:rPr lang="en-US"/>
               <a:pPr/>
-              <a:t>10/11/19</a:t>
+              <a:t>10/20/19</a:t>
             </a:fld>
             <a:endParaRPr lang="en-US" dirty="0"/>
           </a:p>
@@ -2854,7 +2855,7 @@
             <a:fld id="{B61BEF0D-F0BB-DE4B-95CE-6DB70DBA9567}" type="datetimeFigureOut">
               <a:rPr lang="en-US"/>
               <a:pPr/>
-              <a:t>10/11/19</a:t>
+              <a:t>10/20/19</a:t>
             </a:fld>
             <a:endParaRPr lang="en-US" dirty="0"/>
           </a:p>
@@ -3156,7 +3157,7 @@
             <a:fld id="{B61BEF0D-F0BB-DE4B-95CE-6DB70DBA9567}" type="datetimeFigureOut">
               <a:rPr lang="en-US"/>
               <a:pPr/>
-              <a:t>10/11/19</a:t>
+              <a:t>10/20/19</a:t>
             </a:fld>
             <a:endParaRPr lang="en-US" dirty="0"/>
           </a:p>
@@ -3411,7 +3412,7 @@
             <a:fld id="{B61BEF0D-F0BB-DE4B-95CE-6DB70DBA9567}" type="datetimeFigureOut">
               <a:rPr lang="en-US"/>
               <a:pPr/>
-              <a:t>10/11/19</a:t>
+              <a:t>10/20/19</a:t>
             </a:fld>
             <a:endParaRPr lang="en-US" dirty="0"/>
           </a:p>
@@ -3991,8 +3992,8 @@
         </p:nvSpPr>
         <p:spPr>
           <a:xfrm>
-            <a:off x="4611429" y="2967335"/>
-            <a:ext cx="2969146" cy="923330"/>
+            <a:off x="3901524" y="2967335"/>
+            <a:ext cx="4388958" cy="923330"/>
           </a:xfrm>
           <a:prstGeom prst="rect">
             <a:avLst/>
@@ -4025,7 +4026,7 @@
                   </a:outerShdw>
                 </a:effectLst>
               </a:rPr>
-              <a:t>Chapter 4</a:t>
+              <a:t>Chapters 4 &amp; 7</a:t>
             </a:r>
           </a:p>
         </p:txBody>
@@ -4601,6 +4602,16 @@
                 </a:solidFill>
               </a:rPr>
               <a:t>Dynamic scheduling</a:t>
+            </a:r>
+          </a:p>
+          <a:p>
+            <a:r>
+              <a:rPr lang="en-US" sz="2000" dirty="0">
+                <a:solidFill>
+                  <a:srgbClr val="000000"/>
+                </a:solidFill>
+              </a:rPr>
+              <a:t>Fork-join Parallel Programming Model</a:t>
             </a:r>
           </a:p>
         </p:txBody>
@@ -5327,6 +5338,109 @@
                                           <p:spTgt spid="3">
                                             <p:txEl>
                                               <p:pRg st="6" end="6"/>
+                                            </p:txEl>
+                                          </p:spTgt>
+                                        </p:tgtEl>
+                                        <p:attrNameLst>
+                                          <p:attrName>ppt_y</p:attrName>
+                                        </p:attrNameLst>
+                                      </p:cBhvr>
+                                      <p:tavLst>
+                                        <p:tav tm="0">
+                                          <p:val>
+                                            <p:strVal val="1+#ppt_h/2"/>
+                                          </p:val>
+                                        </p:tav>
+                                        <p:tav tm="100000">
+                                          <p:val>
+                                            <p:strVal val="#ppt_y"/>
+                                          </p:val>
+                                        </p:tav>
+                                      </p:tavLst>
+                                    </p:anim>
+                                  </p:childTnLst>
+                                </p:cTn>
+                              </p:par>
+                            </p:childTnLst>
+                          </p:cTn>
+                        </p:par>
+                      </p:childTnLst>
+                    </p:cTn>
+                  </p:par>
+                  <p:par>
+                    <p:cTn id="45" fill="hold">
+                      <p:stCondLst>
+                        <p:cond delay="indefinite"/>
+                      </p:stCondLst>
+                      <p:childTnLst>
+                        <p:par>
+                          <p:cTn id="46" fill="hold">
+                            <p:stCondLst>
+                              <p:cond delay="0"/>
+                            </p:stCondLst>
+                            <p:childTnLst>
+                              <p:par>
+                                <p:cTn id="47" presetID="2" presetClass="entr" presetSubtype="4" fill="hold" grpId="0" nodeType="clickEffect">
+                                  <p:stCondLst>
+                                    <p:cond delay="0"/>
+                                  </p:stCondLst>
+                                  <p:childTnLst>
+                                    <p:set>
+                                      <p:cBhvr>
+                                        <p:cTn id="48" dur="1" fill="hold">
+                                          <p:stCondLst>
+                                            <p:cond delay="0"/>
+                                          </p:stCondLst>
+                                        </p:cTn>
+                                        <p:tgtEl>
+                                          <p:spTgt spid="3">
+                                            <p:txEl>
+                                              <p:pRg st="7" end="7"/>
+                                            </p:txEl>
+                                          </p:spTgt>
+                                        </p:tgtEl>
+                                        <p:attrNameLst>
+                                          <p:attrName>style.visibility</p:attrName>
+                                        </p:attrNameLst>
+                                      </p:cBhvr>
+                                      <p:to>
+                                        <p:strVal val="visible"/>
+                                      </p:to>
+                                    </p:set>
+                                    <p:anim calcmode="lin" valueType="num">
+                                      <p:cBhvr additive="base">
+                                        <p:cTn id="49" dur="500" fill="hold"/>
+                                        <p:tgtEl>
+                                          <p:spTgt spid="3">
+                                            <p:txEl>
+                                              <p:pRg st="7" end="7"/>
+                                            </p:txEl>
+                                          </p:spTgt>
+                                        </p:tgtEl>
+                                        <p:attrNameLst>
+                                          <p:attrName>ppt_x</p:attrName>
+                                        </p:attrNameLst>
+                                      </p:cBhvr>
+                                      <p:tavLst>
+                                        <p:tav tm="0">
+                                          <p:val>
+                                            <p:strVal val="#ppt_x"/>
+                                          </p:val>
+                                        </p:tav>
+                                        <p:tav tm="100000">
+                                          <p:val>
+                                            <p:strVal val="#ppt_x"/>
+                                          </p:val>
+                                        </p:tav>
+                                      </p:tavLst>
+                                    </p:anim>
+                                    <p:anim calcmode="lin" valueType="num">
+                                      <p:cBhvr additive="base">
+                                        <p:cTn id="50" dur="500" fill="hold"/>
+                                        <p:tgtEl>
+                                          <p:spTgt spid="3">
+                                            <p:txEl>
+                                              <p:pRg st="7" end="7"/>
                                             </p:txEl>
                                           </p:spTgt>
                                         </p:tgtEl>
@@ -6534,6 +6648,1281 @@
       </p:grpSpPr>
       <p:sp>
         <p:nvSpPr>
+          <p:cNvPr id="17" name="Rectangle 16">
+            <a:extLst>
+              <a:ext uri="{FF2B5EF4-FFF2-40B4-BE49-F238E27FC236}">
+                <a16:creationId xmlns:a16="http://schemas.microsoft.com/office/drawing/2014/main" id="{AFA67CD3-AB4E-4A7A-BEB8-53C445D8C44E}"/>
+              </a:ext>
+              <a:ext uri="{C183D7F6-B498-43B3-948B-1728B52AA6E4}">
+                <adec:decorative xmlns:adec="http://schemas.microsoft.com/office/drawing/2017/decorative" val="1"/>
+              </a:ext>
+            </a:extLst>
+          </p:cNvPr>
+          <p:cNvSpPr>
+            <a:spLocks noGrp="1" noRot="1" noChangeAspect="1" noMove="1" noResize="1" noEditPoints="1" noAdjustHandles="1" noChangeArrowheads="1" noChangeShapeType="1" noTextEdit="1"/>
+          </p:cNvSpPr>
+          <p:nvPr>
+            <p:extLst>
+              <p:ext uri="{386F3935-93C4-4BCD-93E2-E3B085C9AB24}">
+                <p16:designElem xmlns:p16="http://schemas.microsoft.com/office/powerpoint/2015/main" val="1"/>
+              </p:ext>
+            </p:extLst>
+          </p:nvPr>
+        </p:nvSpPr>
+        <p:spPr>
+          <a:xfrm>
+            <a:off x="1" y="3726"/>
+            <a:ext cx="5614875" cy="6858000"/>
+          </a:xfrm>
+          <a:prstGeom prst="rect">
+            <a:avLst/>
+          </a:prstGeom>
+          <a:gradFill>
+            <a:gsLst>
+              <a:gs pos="0">
+                <a:schemeClr val="accent1">
+                  <a:lumMod val="100000"/>
+                  <a:alpha val="82000"/>
+                </a:schemeClr>
+              </a:gs>
+              <a:gs pos="25000">
+                <a:schemeClr val="accent1">
+                  <a:alpha val="60000"/>
+                </a:schemeClr>
+              </a:gs>
+              <a:gs pos="94000">
+                <a:schemeClr val="bg2">
+                  <a:lumMod val="75000"/>
+                </a:schemeClr>
+              </a:gs>
+              <a:gs pos="100000">
+                <a:schemeClr val="bg2">
+                  <a:lumMod val="75000"/>
+                </a:schemeClr>
+              </a:gs>
+            </a:gsLst>
+            <a:lin ang="4200000" scaled="0"/>
+          </a:gradFill>
+          <a:ln>
+            <a:noFill/>
+          </a:ln>
+        </p:spPr>
+        <p:style>
+          <a:lnRef idx="2">
+            <a:schemeClr val="accent1">
+              <a:shade val="50000"/>
+            </a:schemeClr>
+          </a:lnRef>
+          <a:fillRef idx="1">
+            <a:schemeClr val="accent1"/>
+          </a:fillRef>
+          <a:effectRef idx="0">
+            <a:schemeClr val="accent1"/>
+          </a:effectRef>
+          <a:fontRef idx="minor">
+            <a:schemeClr val="lt1"/>
+          </a:fontRef>
+        </p:style>
+        <p:txBody>
+          <a:bodyPr rtlCol="0" anchor="ctr"/>
+          <a:lstStyle/>
+          <a:p>
+            <a:pPr algn="ctr"/>
+            <a:endParaRPr lang="en-US"/>
+          </a:p>
+        </p:txBody>
+      </p:sp>
+      <p:pic>
+        <p:nvPicPr>
+          <p:cNvPr id="19" name="Picture 18">
+            <a:extLst>
+              <a:ext uri="{FF2B5EF4-FFF2-40B4-BE49-F238E27FC236}">
+                <a16:creationId xmlns:a16="http://schemas.microsoft.com/office/drawing/2014/main" id="{07CF545F-9C2E-4446-97CD-AD92990C2B68}"/>
+              </a:ext>
+              <a:ext uri="{C183D7F6-B498-43B3-948B-1728B52AA6E4}">
+                <adec:decorative xmlns:adec="http://schemas.microsoft.com/office/drawing/2017/decorative" val="1"/>
+              </a:ext>
+            </a:extLst>
+          </p:cNvPr>
+          <p:cNvPicPr>
+            <a:picLocks noGrp="1" noRot="1" noChangeAspect="1" noMove="1" noResize="1" noEditPoints="1" noAdjustHandles="1" noChangeArrowheads="1" noChangeShapeType="1" noCrop="1"/>
+          </p:cNvPicPr>
+          <p:nvPr>
+            <p:extLst>
+              <p:ext uri="{386F3935-93C4-4BCD-93E2-E3B085C9AB24}">
+                <p16:designElem xmlns:p16="http://schemas.microsoft.com/office/powerpoint/2015/main" val="1"/>
+              </p:ext>
+            </p:extLst>
+          </p:nvPr>
+        </p:nvPicPr>
+        <p:blipFill>
+          <a:blip r:embed="rId2">
+            <a:extLst>
+              <a:ext uri="{28A0092B-C50C-407E-A947-70E740481C1C}">
+                <a14:useLocalDpi xmlns:a14="http://schemas.microsoft.com/office/drawing/2010/main" val="0"/>
+              </a:ext>
+            </a:extLst>
+          </a:blip>
+          <a:stretch>
+            <a:fillRect/>
+          </a:stretch>
+        </p:blipFill>
+        <p:spPr>
+          <a:xfrm>
+            <a:off x="0" y="0"/>
+            <a:ext cx="12192000" cy="6858000"/>
+          </a:xfrm>
+          <a:prstGeom prst="rect">
+            <a:avLst/>
+          </a:prstGeom>
+        </p:spPr>
+      </p:pic>
+      <p:sp>
+        <p:nvSpPr>
+          <p:cNvPr id="2" name="Title 1">
+            <a:extLst>
+              <a:ext uri="{FF2B5EF4-FFF2-40B4-BE49-F238E27FC236}">
+                <a16:creationId xmlns:a16="http://schemas.microsoft.com/office/drawing/2014/main" id="{5C2FD327-85CA-0D4F-B22A-B88256ECAB50}"/>
+              </a:ext>
+            </a:extLst>
+          </p:cNvPr>
+          <p:cNvSpPr>
+            <a:spLocks noGrp="1"/>
+          </p:cNvSpPr>
+          <p:nvPr>
+            <p:ph type="title"/>
+          </p:nvPr>
+        </p:nvSpPr>
+        <p:spPr>
+          <a:xfrm>
+            <a:off x="6094105" y="802955"/>
+            <a:ext cx="4977976" cy="1454051"/>
+          </a:xfrm>
+        </p:spPr>
+        <p:txBody>
+          <a:bodyPr vert="horz" lIns="91440" tIns="45720" rIns="91440" bIns="45720" rtlCol="0">
+            <a:normAutofit/>
+          </a:bodyPr>
+          <a:lstStyle/>
+          <a:p>
+            <a:r>
+              <a:rPr lang="en-US" kern="1200">
+                <a:solidFill>
+                  <a:srgbClr val="000000"/>
+                </a:solidFill>
+                <a:latin typeface="+mj-lt"/>
+                <a:ea typeface="+mj-ea"/>
+                <a:cs typeface="+mj-cs"/>
+              </a:rPr>
+              <a:t>Fork-join Model</a:t>
+            </a:r>
+          </a:p>
+        </p:txBody>
+      </p:sp>
+      <p:sp>
+        <p:nvSpPr>
+          <p:cNvPr id="21" name="Freeform 62">
+            <a:extLst>
+              <a:ext uri="{FF2B5EF4-FFF2-40B4-BE49-F238E27FC236}">
+                <a16:creationId xmlns:a16="http://schemas.microsoft.com/office/drawing/2014/main" id="{339C8D78-A644-462F-B674-F440635E5353}"/>
+              </a:ext>
+              <a:ext uri="{C183D7F6-B498-43B3-948B-1728B52AA6E4}">
+                <adec:decorative xmlns:adec="http://schemas.microsoft.com/office/drawing/2017/decorative" val="1"/>
+              </a:ext>
+            </a:extLst>
+          </p:cNvPr>
+          <p:cNvSpPr>
+            <a:spLocks noGrp="1" noRot="1" noChangeAspect="1" noMove="1" noResize="1" noEditPoints="1" noAdjustHandles="1" noChangeArrowheads="1" noChangeShapeType="1" noTextEdit="1"/>
+          </p:cNvSpPr>
+          <p:nvPr>
+            <p:extLst>
+              <p:ext uri="{386F3935-93C4-4BCD-93E2-E3B085C9AB24}">
+                <p16:designElem xmlns:p16="http://schemas.microsoft.com/office/powerpoint/2015/main" val="1"/>
+              </p:ext>
+            </p:extLst>
+          </p:nvPr>
+        </p:nvSpPr>
+        <p:spPr>
+          <a:xfrm>
+            <a:off x="0" y="738619"/>
+            <a:ext cx="5000438" cy="5400962"/>
+          </a:xfrm>
+          <a:custGeom>
+            <a:avLst/>
+            <a:gdLst>
+              <a:gd name="connsiteX0" fmla="*/ 2299956 w 5000438"/>
+              <a:gd name="connsiteY0" fmla="*/ 0 h 5400962"/>
+              <a:gd name="connsiteX1" fmla="*/ 5000438 w 5000438"/>
+              <a:gd name="connsiteY1" fmla="*/ 2700481 h 5400962"/>
+              <a:gd name="connsiteX2" fmla="*/ 2299956 w 5000438"/>
+              <a:gd name="connsiteY2" fmla="*/ 5400962 h 5400962"/>
+              <a:gd name="connsiteX3" fmla="*/ 60675 w 5000438"/>
+              <a:gd name="connsiteY3" fmla="*/ 4210346 h 5400962"/>
+              <a:gd name="connsiteX4" fmla="*/ 0 w 5000438"/>
+              <a:gd name="connsiteY4" fmla="*/ 4110472 h 5400962"/>
+              <a:gd name="connsiteX5" fmla="*/ 0 w 5000438"/>
+              <a:gd name="connsiteY5" fmla="*/ 1290491 h 5400962"/>
+              <a:gd name="connsiteX6" fmla="*/ 60675 w 5000438"/>
+              <a:gd name="connsiteY6" fmla="*/ 1190617 h 5400962"/>
+              <a:gd name="connsiteX7" fmla="*/ 2299956 w 5000438"/>
+              <a:gd name="connsiteY7" fmla="*/ 0 h 5400962"/>
+            </a:gdLst>
+            <a:ahLst/>
+            <a:cxnLst>
+              <a:cxn ang="0">
+                <a:pos x="connsiteX0" y="connsiteY0"/>
+              </a:cxn>
+              <a:cxn ang="0">
+                <a:pos x="connsiteX1" y="connsiteY1"/>
+              </a:cxn>
+              <a:cxn ang="0">
+                <a:pos x="connsiteX2" y="connsiteY2"/>
+              </a:cxn>
+              <a:cxn ang="0">
+                <a:pos x="connsiteX3" y="connsiteY3"/>
+              </a:cxn>
+              <a:cxn ang="0">
+                <a:pos x="connsiteX4" y="connsiteY4"/>
+              </a:cxn>
+              <a:cxn ang="0">
+                <a:pos x="connsiteX5" y="connsiteY5"/>
+              </a:cxn>
+              <a:cxn ang="0">
+                <a:pos x="connsiteX6" y="connsiteY6"/>
+              </a:cxn>
+              <a:cxn ang="0">
+                <a:pos x="connsiteX7" y="connsiteY7"/>
+              </a:cxn>
+            </a:cxnLst>
+            <a:rect l="l" t="t" r="r" b="b"/>
+            <a:pathLst>
+              <a:path w="5000438" h="5400962">
+                <a:moveTo>
+                  <a:pt x="2299956" y="0"/>
+                </a:moveTo>
+                <a:cubicBezTo>
+                  <a:pt x="3791390" y="0"/>
+                  <a:pt x="5000438" y="1209047"/>
+                  <a:pt x="5000438" y="2700481"/>
+                </a:cubicBezTo>
+                <a:cubicBezTo>
+                  <a:pt x="5000438" y="4191915"/>
+                  <a:pt x="3791390" y="5400962"/>
+                  <a:pt x="2299956" y="5400962"/>
+                </a:cubicBezTo>
+                <a:cubicBezTo>
+                  <a:pt x="1367810" y="5400962"/>
+                  <a:pt x="545971" y="4928678"/>
+                  <a:pt x="60675" y="4210346"/>
+                </a:cubicBezTo>
+                <a:lnTo>
+                  <a:pt x="0" y="4110472"/>
+                </a:lnTo>
+                <a:lnTo>
+                  <a:pt x="0" y="1290491"/>
+                </a:lnTo>
+                <a:lnTo>
+                  <a:pt x="60675" y="1190617"/>
+                </a:lnTo>
+                <a:cubicBezTo>
+                  <a:pt x="545971" y="472284"/>
+                  <a:pt x="1367810" y="0"/>
+                  <a:pt x="2299956" y="0"/>
+                </a:cubicBezTo>
+                <a:close/>
+              </a:path>
+            </a:pathLst>
+          </a:custGeom>
+          <a:solidFill>
+            <a:srgbClr val="FFFFFF"/>
+          </a:solidFill>
+          <a:ln>
+            <a:gradFill>
+              <a:gsLst>
+                <a:gs pos="0">
+                  <a:schemeClr val="accent1">
+                    <a:lumMod val="40000"/>
+                    <a:lumOff val="60000"/>
+                  </a:schemeClr>
+                </a:gs>
+                <a:gs pos="23000">
+                  <a:schemeClr val="accent1">
+                    <a:lumMod val="45000"/>
+                    <a:lumOff val="55000"/>
+                  </a:schemeClr>
+                </a:gs>
+                <a:gs pos="83000">
+                  <a:schemeClr val="bg2">
+                    <a:lumMod val="85000"/>
+                  </a:schemeClr>
+                </a:gs>
+                <a:gs pos="100000">
+                  <a:schemeClr val="bg2">
+                    <a:lumMod val="85000"/>
+                  </a:schemeClr>
+                </a:gs>
+              </a:gsLst>
+              <a:lin ang="5400000" scaled="1"/>
+            </a:gradFill>
+          </a:ln>
+        </p:spPr>
+        <p:style>
+          <a:lnRef idx="2">
+            <a:schemeClr val="accent1">
+              <a:shade val="50000"/>
+            </a:schemeClr>
+          </a:lnRef>
+          <a:fillRef idx="1">
+            <a:schemeClr val="accent1"/>
+          </a:fillRef>
+          <a:effectRef idx="0">
+            <a:schemeClr val="accent1"/>
+          </a:effectRef>
+          <a:fontRef idx="minor">
+            <a:schemeClr val="lt1"/>
+          </a:fontRef>
+        </p:style>
+        <p:txBody>
+          <a:bodyPr wrap="square" rtlCol="0" anchor="ctr">
+            <a:noAutofit/>
+          </a:bodyPr>
+          <a:lstStyle/>
+          <a:p>
+            <a:pPr algn="ctr"/>
+            <a:endParaRPr lang="en-US"/>
+          </a:p>
+        </p:txBody>
+      </p:sp>
+      <p:pic>
+        <p:nvPicPr>
+          <p:cNvPr id="14" name="Graphic 13" descr="Pause">
+            <a:extLst>
+              <a:ext uri="{FF2B5EF4-FFF2-40B4-BE49-F238E27FC236}">
+                <a16:creationId xmlns:a16="http://schemas.microsoft.com/office/drawing/2014/main" id="{85BF53D9-9F2B-4353-844F-1651CB5B3514}"/>
+              </a:ext>
+            </a:extLst>
+          </p:cNvPr>
+          <p:cNvPicPr>
+            <a:picLocks noChangeAspect="1"/>
+          </p:cNvPicPr>
+          <p:nvPr/>
+        </p:nvPicPr>
+        <p:blipFill>
+          <a:blip r:embed="rId3">
+            <a:extLst>
+              <a:ext uri="{28A0092B-C50C-407E-A947-70E740481C1C}">
+                <a14:useLocalDpi xmlns:a14="http://schemas.microsoft.com/office/drawing/2010/main" val="0"/>
+              </a:ext>
+              <a:ext uri="{96DAC541-7B7A-43D3-8B79-37D633B846F1}">
+                <asvg:svgBlip xmlns:asvg="http://schemas.microsoft.com/office/drawing/2016/SVG/main" r:embed="rId4"/>
+              </a:ext>
+            </a:extLst>
+          </a:blip>
+          <a:stretch>
+            <a:fillRect/>
+          </a:stretch>
+        </p:blipFill>
+        <p:spPr>
+          <a:xfrm>
+            <a:off x="450254" y="1629089"/>
+            <a:ext cx="3620021" cy="3620021"/>
+          </a:xfrm>
+          <a:prstGeom prst="rect">
+            <a:avLst/>
+          </a:prstGeom>
+        </p:spPr>
+      </p:pic>
+      <mc:AlternateContent xmlns:mc="http://schemas.openxmlformats.org/markup-compatibility/2006">
+        <mc:Choice xmlns:a14="http://schemas.microsoft.com/office/drawing/2010/main" Requires="a14">
+          <p:sp>
+            <p:nvSpPr>
+              <p:cNvPr id="3" name="Content Placeholder 2">
+                <a:extLst>
+                  <a:ext uri="{FF2B5EF4-FFF2-40B4-BE49-F238E27FC236}">
+                    <a16:creationId xmlns:a16="http://schemas.microsoft.com/office/drawing/2014/main" id="{8AC731AA-3FF2-6943-AECA-3A63B696E73A}"/>
+                  </a:ext>
+                </a:extLst>
+              </p:cNvPr>
+              <p:cNvSpPr>
+                <a:spLocks noGrp="1"/>
+              </p:cNvSpPr>
+              <p:nvPr>
+                <p:ph idx="1"/>
+              </p:nvPr>
+            </p:nvSpPr>
+            <p:spPr>
+              <a:xfrm>
+                <a:off x="6090574" y="2421682"/>
+                <a:ext cx="4977578" cy="3639289"/>
+              </a:xfrm>
+            </p:spPr>
+            <p:txBody>
+              <a:bodyPr vert="horz" lIns="91440" tIns="45720" rIns="91440" bIns="45720" rtlCol="0" anchor="ctr">
+                <a:normAutofit/>
+              </a:bodyPr>
+              <a:lstStyle/>
+              <a:p>
+                <a:pPr marL="0" indent="0">
+                  <a:buNone/>
+                </a:pPr>
+                <a14:m>
+                  <m:oMathPara xmlns:m="http://schemas.openxmlformats.org/officeDocument/2006/math">
+                    <m:oMathParaPr>
+                      <m:jc m:val="left"/>
+                    </m:oMathParaPr>
+                    <m:oMath xmlns:m="http://schemas.openxmlformats.org/officeDocument/2006/math">
+                      <m:r>
+                        <a:rPr lang="en-US" sz="2000" b="0" i="1" kern="1200">
+                          <a:solidFill>
+                            <a:srgbClr val="000000"/>
+                          </a:solidFill>
+                          <a:latin typeface="Cambria Math" panose="02040503050406030204" pitchFamily="18" charset="0"/>
+                          <a:ea typeface="+mn-ea"/>
+                          <a:cs typeface="+mn-cs"/>
+                        </a:rPr>
+                        <m:t>𝐸</m:t>
+                      </m:r>
+                      <m:d>
+                        <m:dPr>
+                          <m:ctrlPr>
+                            <a:rPr lang="en-US" sz="2000" b="0" i="1" kern="1200">
+                              <a:solidFill>
+                                <a:srgbClr val="000000"/>
+                              </a:solidFill>
+                              <a:latin typeface="Cambria Math" panose="02040503050406030204" pitchFamily="18" charset="0"/>
+                              <a:ea typeface="+mn-ea"/>
+                              <a:cs typeface="+mn-cs"/>
+                            </a:rPr>
+                          </m:ctrlPr>
+                        </m:dPr>
+                        <m:e>
+                          <m:sSub>
+                            <m:sSubPr>
+                              <m:ctrlPr>
+                                <a:rPr lang="en-US" sz="2000" b="0" i="1" kern="1200">
+                                  <a:solidFill>
+                                    <a:srgbClr val="000000"/>
+                                  </a:solidFill>
+                                  <a:latin typeface="Cambria Math" panose="02040503050406030204" pitchFamily="18" charset="0"/>
+                                  <a:ea typeface="+mn-ea"/>
+                                  <a:cs typeface="+mn-cs"/>
+                                </a:rPr>
+                              </m:ctrlPr>
+                            </m:sSubPr>
+                            <m:e>
+                              <m:r>
+                                <a:rPr lang="en-US" sz="2000" b="0" i="1" kern="1200">
+                                  <a:solidFill>
+                                    <a:srgbClr val="000000"/>
+                                  </a:solidFill>
+                                  <a:latin typeface="Cambria Math" panose="02040503050406030204" pitchFamily="18" charset="0"/>
+                                  <a:ea typeface="+mn-ea"/>
+                                  <a:cs typeface="+mn-cs"/>
+                                </a:rPr>
+                                <m:t>𝑇</m:t>
+                              </m:r>
+                            </m:e>
+                            <m:sub>
+                              <m:r>
+                                <a:rPr lang="en-US" sz="2000" b="0" i="1" kern="1200">
+                                  <a:solidFill>
+                                    <a:srgbClr val="000000"/>
+                                  </a:solidFill>
+                                  <a:latin typeface="Cambria Math" panose="02040503050406030204" pitchFamily="18" charset="0"/>
+                                  <a:ea typeface="+mn-ea"/>
+                                  <a:cs typeface="+mn-cs"/>
+                                </a:rPr>
+                                <m:t>𝑃</m:t>
+                              </m:r>
+                            </m:sub>
+                          </m:sSub>
+                        </m:e>
+                      </m:d>
+                      <m:r>
+                        <a:rPr lang="en-US" sz="2000" i="1">
+                          <a:solidFill>
+                            <a:srgbClr val="000000"/>
+                          </a:solidFill>
+                          <a:latin typeface="Cambria Math" panose="02040503050406030204" pitchFamily="18" charset="0"/>
+                        </a:rPr>
+                        <m:t>∈</m:t>
+                      </m:r>
+                      <m:r>
+                        <a:rPr lang="en-US" sz="2000" b="0" i="1" kern="1200">
+                          <a:solidFill>
+                            <a:srgbClr val="000000"/>
+                          </a:solidFill>
+                          <a:latin typeface="Cambria Math" panose="02040503050406030204" pitchFamily="18" charset="0"/>
+                          <a:ea typeface="+mn-ea"/>
+                          <a:cs typeface="+mn-cs"/>
+                        </a:rPr>
+                        <m:t>𝑂</m:t>
+                      </m:r>
+                      <m:d>
+                        <m:dPr>
+                          <m:ctrlPr>
+                            <a:rPr lang="en-US" sz="2000" b="0" i="1" kern="1200">
+                              <a:solidFill>
+                                <a:srgbClr val="000000"/>
+                              </a:solidFill>
+                              <a:latin typeface="Cambria Math" panose="02040503050406030204" pitchFamily="18" charset="0"/>
+                              <a:ea typeface="+mn-ea"/>
+                              <a:cs typeface="+mn-cs"/>
+                            </a:rPr>
+                          </m:ctrlPr>
+                        </m:dPr>
+                        <m:e>
+                          <m:f>
+                            <m:fPr>
+                              <m:ctrlPr>
+                                <a:rPr lang="en-US" sz="2000" b="0" i="1" kern="1200">
+                                  <a:solidFill>
+                                    <a:srgbClr val="000000"/>
+                                  </a:solidFill>
+                                  <a:latin typeface="Cambria Math" panose="02040503050406030204" pitchFamily="18" charset="0"/>
+                                  <a:ea typeface="+mn-ea"/>
+                                  <a:cs typeface="+mn-cs"/>
+                                </a:rPr>
+                              </m:ctrlPr>
+                            </m:fPr>
+                            <m:num>
+                              <m:sSub>
+                                <m:sSubPr>
+                                  <m:ctrlPr>
+                                    <a:rPr lang="en-US" sz="2000" b="0" i="1" kern="1200">
+                                      <a:solidFill>
+                                        <a:srgbClr val="000000"/>
+                                      </a:solidFill>
+                                      <a:latin typeface="Cambria Math" panose="02040503050406030204" pitchFamily="18" charset="0"/>
+                                      <a:ea typeface="+mn-ea"/>
+                                      <a:cs typeface="+mn-cs"/>
+                                    </a:rPr>
+                                  </m:ctrlPr>
+                                </m:sSubPr>
+                                <m:e>
+                                  <m:r>
+                                    <a:rPr lang="en-US" sz="2000" b="0" i="1" kern="1200">
+                                      <a:solidFill>
+                                        <a:srgbClr val="000000"/>
+                                      </a:solidFill>
+                                      <a:latin typeface="Cambria Math" panose="02040503050406030204" pitchFamily="18" charset="0"/>
+                                      <a:ea typeface="+mn-ea"/>
+                                      <a:cs typeface="+mn-cs"/>
+                                    </a:rPr>
+                                    <m:t>𝑇</m:t>
+                                  </m:r>
+                                </m:e>
+                                <m:sub>
+                                  <m:r>
+                                    <a:rPr lang="en-US" sz="2000" b="0" i="1" kern="1200">
+                                      <a:solidFill>
+                                        <a:srgbClr val="000000"/>
+                                      </a:solidFill>
+                                      <a:latin typeface="Cambria Math" panose="02040503050406030204" pitchFamily="18" charset="0"/>
+                                      <a:ea typeface="+mn-ea"/>
+                                      <a:cs typeface="+mn-cs"/>
+                                    </a:rPr>
+                                    <m:t>1</m:t>
+                                  </m:r>
+                                </m:sub>
+                              </m:sSub>
+                            </m:num>
+                            <m:den>
+                              <m:r>
+                                <a:rPr lang="en-US" sz="2000" b="0" i="1" kern="1200">
+                                  <a:solidFill>
+                                    <a:srgbClr val="000000"/>
+                                  </a:solidFill>
+                                  <a:latin typeface="Cambria Math" panose="02040503050406030204" pitchFamily="18" charset="0"/>
+                                  <a:ea typeface="+mn-ea"/>
+                                  <a:cs typeface="+mn-cs"/>
+                                </a:rPr>
+                                <m:t>𝑃</m:t>
+                              </m:r>
+                            </m:den>
+                          </m:f>
+                          <m:r>
+                            <a:rPr lang="en-US" sz="2000" b="0" i="1" kern="1200">
+                              <a:solidFill>
+                                <a:srgbClr val="000000"/>
+                              </a:solidFill>
+                              <a:latin typeface="Cambria Math" panose="02040503050406030204" pitchFamily="18" charset="0"/>
+                              <a:ea typeface="+mn-ea"/>
+                              <a:cs typeface="+mn-cs"/>
+                            </a:rPr>
+                            <m:t>+</m:t>
+                          </m:r>
+                          <m:sSub>
+                            <m:sSubPr>
+                              <m:ctrlPr>
+                                <a:rPr lang="en-US" sz="2000" b="0" i="1" kern="1200">
+                                  <a:solidFill>
+                                    <a:srgbClr val="000000"/>
+                                  </a:solidFill>
+                                  <a:latin typeface="Cambria Math" panose="02040503050406030204" pitchFamily="18" charset="0"/>
+                                  <a:ea typeface="+mn-ea"/>
+                                  <a:cs typeface="+mn-cs"/>
+                                </a:rPr>
+                              </m:ctrlPr>
+                            </m:sSubPr>
+                            <m:e>
+                              <m:r>
+                                <a:rPr lang="en-US" sz="2000" b="0" i="1" kern="1200">
+                                  <a:solidFill>
+                                    <a:srgbClr val="000000"/>
+                                  </a:solidFill>
+                                  <a:latin typeface="Cambria Math" panose="02040503050406030204" pitchFamily="18" charset="0"/>
+                                  <a:ea typeface="+mn-ea"/>
+                                  <a:cs typeface="+mn-cs"/>
+                                </a:rPr>
+                                <m:t>𝑇</m:t>
+                              </m:r>
+                            </m:e>
+                            <m:sub>
+                              <m:r>
+                                <a:rPr lang="en-US" sz="2000" b="0" i="1" kern="1200">
+                                  <a:solidFill>
+                                    <a:srgbClr val="000000"/>
+                                  </a:solidFill>
+                                  <a:latin typeface="Cambria Math" panose="02040503050406030204" pitchFamily="18" charset="0"/>
+                                  <a:ea typeface="Cambria Math" panose="02040503050406030204" pitchFamily="18" charset="0"/>
+                                </a:rPr>
+                                <m:t>∞</m:t>
+                              </m:r>
+                            </m:sub>
+                          </m:sSub>
+                        </m:e>
+                      </m:d>
+                    </m:oMath>
+                  </m:oMathPara>
+                </a14:m>
+                <a:endParaRPr lang="en-US" sz="2000" b="0" kern="1200">
+                  <a:solidFill>
+                    <a:srgbClr val="000000"/>
+                  </a:solidFill>
+                  <a:ea typeface="Cambria Math" panose="02040503050406030204" pitchFamily="18" charset="0"/>
+                </a:endParaRPr>
+              </a:p>
+              <a:p>
+                <a:pPr marL="0" indent="0">
+                  <a:buNone/>
+                </a:pPr>
+                <a:r>
+                  <a:rPr lang="en-US" sz="2000" b="0" kern="1200">
+                    <a:solidFill>
+                      <a:srgbClr val="000000"/>
+                    </a:solidFill>
+                    <a:ea typeface="+mn-ea"/>
+                    <a:cs typeface="+mn-cs"/>
+                  </a:rPr>
+                  <a:t>Parallel prefix sum (implementation from scratch)</a:t>
+                </a:r>
+              </a:p>
+              <a:p>
+                <a:pPr marL="0" indent="0">
+                  <a:buNone/>
+                </a:pPr>
+                <a:r>
+                  <a:rPr lang="en-US" sz="2000">
+                    <a:solidFill>
+                      <a:srgbClr val="000000"/>
+                    </a:solidFill>
+                  </a:rPr>
+                  <a:t>Parallel pack operation using the built-in Java SE 8 </a:t>
+                </a:r>
+                <a:r>
+                  <a:rPr lang="en-US" sz="1600">
+                    <a:solidFill>
+                      <a:srgbClr val="000000"/>
+                    </a:solidFill>
+                    <a:latin typeface="Courier New" panose="02070309020205020404" pitchFamily="49" charset="0"/>
+                    <a:cs typeface="Courier New" panose="02070309020205020404" pitchFamily="49" charset="0"/>
+                  </a:rPr>
+                  <a:t>java.util.Arrays.parallelPrefix</a:t>
+                </a:r>
+                <a:endParaRPr lang="en-US" sz="1600" b="0" kern="1200">
+                  <a:solidFill>
+                    <a:srgbClr val="000000"/>
+                  </a:solidFill>
+                  <a:latin typeface="Courier New" panose="02070309020205020404" pitchFamily="49" charset="0"/>
+                  <a:cs typeface="Courier New" panose="02070309020205020404" pitchFamily="49" charset="0"/>
+                </a:endParaRPr>
+              </a:p>
+              <a:p>
+                <a:pPr marL="0" indent="0">
+                  <a:buNone/>
+                </a:pPr>
+                <a:r>
+                  <a:rPr lang="en-US" sz="2000">
+                    <a:solidFill>
+                      <a:srgbClr val="000000"/>
+                    </a:solidFill>
+                  </a:rPr>
+                  <a:t>Parallel quick-sort using parallel prefix sum and packing (again you already have this in </a:t>
+                </a:r>
+                <a:r>
+                  <a:rPr lang="en-US" sz="1600">
+                    <a:solidFill>
+                      <a:srgbClr val="000000"/>
+                    </a:solidFill>
+                    <a:latin typeface="Courier New" panose="02070309020205020404" pitchFamily="49" charset="0"/>
+                    <a:cs typeface="Courier New" panose="02070309020205020404" pitchFamily="49" charset="0"/>
+                  </a:rPr>
+                  <a:t>java.util.Arrays.parallelSort</a:t>
+                </a:r>
+                <a:r>
+                  <a:rPr lang="en-US" sz="2000">
+                    <a:solidFill>
+                      <a:srgbClr val="000000"/>
+                    </a:solidFill>
+                  </a:rPr>
+                  <a:t>).</a:t>
+                </a:r>
+              </a:p>
+            </p:txBody>
+          </p:sp>
+        </mc:Choice>
+        <mc:Fallback>
+          <p:sp>
+            <p:nvSpPr>
+              <p:cNvPr id="3" name="Content Placeholder 2">
+                <a:extLst>
+                  <a:ext uri="{FF2B5EF4-FFF2-40B4-BE49-F238E27FC236}">
+                    <a16:creationId xmlns:a16="http://schemas.microsoft.com/office/drawing/2014/main" id="{8AC731AA-3FF2-6943-AECA-3A63B696E73A}"/>
+                  </a:ext>
+                </a:extLst>
+              </p:cNvPr>
+              <p:cNvSpPr>
+                <a:spLocks noGrp="1" noRot="1" noChangeAspect="1" noMove="1" noResize="1" noEditPoints="1" noAdjustHandles="1" noChangeArrowheads="1" noChangeShapeType="1" noTextEdit="1"/>
+              </p:cNvSpPr>
+              <p:nvPr>
+                <p:ph idx="1"/>
+              </p:nvPr>
+            </p:nvSpPr>
+            <p:spPr>
+              <a:xfrm>
+                <a:off x="6090574" y="2421682"/>
+                <a:ext cx="4977578" cy="3639289"/>
+              </a:xfrm>
+              <a:blipFill>
+                <a:blip r:embed="rId5"/>
+                <a:stretch>
+                  <a:fillRect l="-1531"/>
+                </a:stretch>
+              </a:blipFill>
+            </p:spPr>
+            <p:txBody>
+              <a:bodyPr/>
+              <a:lstStyle/>
+              <a:p>
+                <a:r>
+                  <a:rPr lang="en-US">
+                    <a:noFill/>
+                  </a:rPr>
+                  <a:t> </a:t>
+                </a:r>
+              </a:p>
+            </p:txBody>
+          </p:sp>
+        </mc:Fallback>
+      </mc:AlternateContent>
+    </p:spTree>
+    <p:extLst>
+      <p:ext uri="{BB962C8B-B14F-4D97-AF65-F5344CB8AC3E}">
+        <p14:creationId xmlns:p14="http://schemas.microsoft.com/office/powerpoint/2010/main" val="914069129"/>
+      </p:ext>
+    </p:extLst>
+  </p:cSld>
+  <p:clrMapOvr>
+    <a:masterClrMapping/>
+  </p:clrMapOvr>
+  <mc:AlternateContent xmlns:mc="http://schemas.openxmlformats.org/markup-compatibility/2006" xmlns:p15="http://schemas.microsoft.com/office/powerpoint/2012/main">
+    <mc:Choice Requires="p15">
+      <p:transition xmlns:p14="http://schemas.microsoft.com/office/powerpoint/2010/main" spd="slow" p14:dur="2000">
+        <p15:prstTrans prst="drape"/>
+      </p:transition>
+    </mc:Choice>
+    <mc:Fallback xmlns="">
+      <p:transition spd="slow">
+        <p:fade/>
+      </p:transition>
+    </mc:Fallback>
+  </mc:AlternateContent>
+  <p:timing>
+    <p:tnLst>
+      <p:par>
+        <p:cTn id="1" dur="indefinite" restart="never" nodeType="tmRoot">
+          <p:childTnLst>
+            <p:seq concurrent="1" nextAc="seek">
+              <p:cTn id="2" dur="indefinite" nodeType="mainSeq">
+                <p:childTnLst>
+                  <p:par>
+                    <p:cTn id="3" fill="hold">
+                      <p:stCondLst>
+                        <p:cond delay="indefinite"/>
+                      </p:stCondLst>
+                      <p:childTnLst>
+                        <p:par>
+                          <p:cTn id="4" fill="hold">
+                            <p:stCondLst>
+                              <p:cond delay="0"/>
+                            </p:stCondLst>
+                            <p:childTnLst>
+                              <p:par>
+                                <p:cTn id="5" presetID="2" presetClass="entr" presetSubtype="4" fill="hold" grpId="0" nodeType="clickEffect">
+                                  <p:stCondLst>
+                                    <p:cond delay="0"/>
+                                  </p:stCondLst>
+                                  <p:childTnLst>
+                                    <p:set>
+                                      <p:cBhvr>
+                                        <p:cTn id="6" dur="1" fill="hold">
+                                          <p:stCondLst>
+                                            <p:cond delay="0"/>
+                                          </p:stCondLst>
+                                        </p:cTn>
+                                        <p:tgtEl>
+                                          <p:spTgt spid="3">
+                                            <p:txEl>
+                                              <p:pRg st="0" end="0"/>
+                                            </p:txEl>
+                                          </p:spTgt>
+                                        </p:tgtEl>
+                                        <p:attrNameLst>
+                                          <p:attrName>style.visibility</p:attrName>
+                                        </p:attrNameLst>
+                                      </p:cBhvr>
+                                      <p:to>
+                                        <p:strVal val="visible"/>
+                                      </p:to>
+                                    </p:set>
+                                    <p:anim calcmode="lin" valueType="num">
+                                      <p:cBhvr additive="base">
+                                        <p:cTn id="7" dur="500" fill="hold"/>
+                                        <p:tgtEl>
+                                          <p:spTgt spid="3">
+                                            <p:txEl>
+                                              <p:pRg st="0" end="0"/>
+                                            </p:txEl>
+                                          </p:spTgt>
+                                        </p:tgtEl>
+                                        <p:attrNameLst>
+                                          <p:attrName>ppt_x</p:attrName>
+                                        </p:attrNameLst>
+                                      </p:cBhvr>
+                                      <p:tavLst>
+                                        <p:tav tm="0">
+                                          <p:val>
+                                            <p:strVal val="#ppt_x"/>
+                                          </p:val>
+                                        </p:tav>
+                                        <p:tav tm="100000">
+                                          <p:val>
+                                            <p:strVal val="#ppt_x"/>
+                                          </p:val>
+                                        </p:tav>
+                                      </p:tavLst>
+                                    </p:anim>
+                                    <p:anim calcmode="lin" valueType="num">
+                                      <p:cBhvr additive="base">
+                                        <p:cTn id="8" dur="500" fill="hold"/>
+                                        <p:tgtEl>
+                                          <p:spTgt spid="3">
+                                            <p:txEl>
+                                              <p:pRg st="0" end="0"/>
+                                            </p:txEl>
+                                          </p:spTgt>
+                                        </p:tgtEl>
+                                        <p:attrNameLst>
+                                          <p:attrName>ppt_y</p:attrName>
+                                        </p:attrNameLst>
+                                      </p:cBhvr>
+                                      <p:tavLst>
+                                        <p:tav tm="0">
+                                          <p:val>
+                                            <p:strVal val="1+#ppt_h/2"/>
+                                          </p:val>
+                                        </p:tav>
+                                        <p:tav tm="100000">
+                                          <p:val>
+                                            <p:strVal val="#ppt_y"/>
+                                          </p:val>
+                                        </p:tav>
+                                      </p:tavLst>
+                                    </p:anim>
+                                  </p:childTnLst>
+                                </p:cTn>
+                              </p:par>
+                            </p:childTnLst>
+                          </p:cTn>
+                        </p:par>
+                      </p:childTnLst>
+                    </p:cTn>
+                  </p:par>
+                  <p:par>
+                    <p:cTn id="9" fill="hold">
+                      <p:stCondLst>
+                        <p:cond delay="indefinite"/>
+                      </p:stCondLst>
+                      <p:childTnLst>
+                        <p:par>
+                          <p:cTn id="10" fill="hold">
+                            <p:stCondLst>
+                              <p:cond delay="0"/>
+                            </p:stCondLst>
+                            <p:childTnLst>
+                              <p:par>
+                                <p:cTn id="11" presetID="2" presetClass="entr" presetSubtype="4" fill="hold" grpId="0" nodeType="clickEffect">
+                                  <p:stCondLst>
+                                    <p:cond delay="0"/>
+                                  </p:stCondLst>
+                                  <p:childTnLst>
+                                    <p:set>
+                                      <p:cBhvr>
+                                        <p:cTn id="12" dur="1" fill="hold">
+                                          <p:stCondLst>
+                                            <p:cond delay="0"/>
+                                          </p:stCondLst>
+                                        </p:cTn>
+                                        <p:tgtEl>
+                                          <p:spTgt spid="3">
+                                            <p:txEl>
+                                              <p:pRg st="1" end="1"/>
+                                            </p:txEl>
+                                          </p:spTgt>
+                                        </p:tgtEl>
+                                        <p:attrNameLst>
+                                          <p:attrName>style.visibility</p:attrName>
+                                        </p:attrNameLst>
+                                      </p:cBhvr>
+                                      <p:to>
+                                        <p:strVal val="visible"/>
+                                      </p:to>
+                                    </p:set>
+                                    <p:anim calcmode="lin" valueType="num">
+                                      <p:cBhvr additive="base">
+                                        <p:cTn id="13" dur="500" fill="hold"/>
+                                        <p:tgtEl>
+                                          <p:spTgt spid="3">
+                                            <p:txEl>
+                                              <p:pRg st="1" end="1"/>
+                                            </p:txEl>
+                                          </p:spTgt>
+                                        </p:tgtEl>
+                                        <p:attrNameLst>
+                                          <p:attrName>ppt_x</p:attrName>
+                                        </p:attrNameLst>
+                                      </p:cBhvr>
+                                      <p:tavLst>
+                                        <p:tav tm="0">
+                                          <p:val>
+                                            <p:strVal val="#ppt_x"/>
+                                          </p:val>
+                                        </p:tav>
+                                        <p:tav tm="100000">
+                                          <p:val>
+                                            <p:strVal val="#ppt_x"/>
+                                          </p:val>
+                                        </p:tav>
+                                      </p:tavLst>
+                                    </p:anim>
+                                    <p:anim calcmode="lin" valueType="num">
+                                      <p:cBhvr additive="base">
+                                        <p:cTn id="14" dur="500" fill="hold"/>
+                                        <p:tgtEl>
+                                          <p:spTgt spid="3">
+                                            <p:txEl>
+                                              <p:pRg st="1" end="1"/>
+                                            </p:txEl>
+                                          </p:spTgt>
+                                        </p:tgtEl>
+                                        <p:attrNameLst>
+                                          <p:attrName>ppt_y</p:attrName>
+                                        </p:attrNameLst>
+                                      </p:cBhvr>
+                                      <p:tavLst>
+                                        <p:tav tm="0">
+                                          <p:val>
+                                            <p:strVal val="1+#ppt_h/2"/>
+                                          </p:val>
+                                        </p:tav>
+                                        <p:tav tm="100000">
+                                          <p:val>
+                                            <p:strVal val="#ppt_y"/>
+                                          </p:val>
+                                        </p:tav>
+                                      </p:tavLst>
+                                    </p:anim>
+                                  </p:childTnLst>
+                                </p:cTn>
+                              </p:par>
+                            </p:childTnLst>
+                          </p:cTn>
+                        </p:par>
+                      </p:childTnLst>
+                    </p:cTn>
+                  </p:par>
+                  <p:par>
+                    <p:cTn id="15" fill="hold">
+                      <p:stCondLst>
+                        <p:cond delay="indefinite"/>
+                      </p:stCondLst>
+                      <p:childTnLst>
+                        <p:par>
+                          <p:cTn id="16" fill="hold">
+                            <p:stCondLst>
+                              <p:cond delay="0"/>
+                            </p:stCondLst>
+                            <p:childTnLst>
+                              <p:par>
+                                <p:cTn id="17" presetID="2" presetClass="entr" presetSubtype="4" fill="hold" grpId="0" nodeType="clickEffect">
+                                  <p:stCondLst>
+                                    <p:cond delay="0"/>
+                                  </p:stCondLst>
+                                  <p:childTnLst>
+                                    <p:set>
+                                      <p:cBhvr>
+                                        <p:cTn id="18" dur="1" fill="hold">
+                                          <p:stCondLst>
+                                            <p:cond delay="0"/>
+                                          </p:stCondLst>
+                                        </p:cTn>
+                                        <p:tgtEl>
+                                          <p:spTgt spid="3">
+                                            <p:txEl>
+                                              <p:pRg st="2" end="2"/>
+                                            </p:txEl>
+                                          </p:spTgt>
+                                        </p:tgtEl>
+                                        <p:attrNameLst>
+                                          <p:attrName>style.visibility</p:attrName>
+                                        </p:attrNameLst>
+                                      </p:cBhvr>
+                                      <p:to>
+                                        <p:strVal val="visible"/>
+                                      </p:to>
+                                    </p:set>
+                                    <p:anim calcmode="lin" valueType="num">
+                                      <p:cBhvr additive="base">
+                                        <p:cTn id="19" dur="500" fill="hold"/>
+                                        <p:tgtEl>
+                                          <p:spTgt spid="3">
+                                            <p:txEl>
+                                              <p:pRg st="2" end="2"/>
+                                            </p:txEl>
+                                          </p:spTgt>
+                                        </p:tgtEl>
+                                        <p:attrNameLst>
+                                          <p:attrName>ppt_x</p:attrName>
+                                        </p:attrNameLst>
+                                      </p:cBhvr>
+                                      <p:tavLst>
+                                        <p:tav tm="0">
+                                          <p:val>
+                                            <p:strVal val="#ppt_x"/>
+                                          </p:val>
+                                        </p:tav>
+                                        <p:tav tm="100000">
+                                          <p:val>
+                                            <p:strVal val="#ppt_x"/>
+                                          </p:val>
+                                        </p:tav>
+                                      </p:tavLst>
+                                    </p:anim>
+                                    <p:anim calcmode="lin" valueType="num">
+                                      <p:cBhvr additive="base">
+                                        <p:cTn id="20" dur="500" fill="hold"/>
+                                        <p:tgtEl>
+                                          <p:spTgt spid="3">
+                                            <p:txEl>
+                                              <p:pRg st="2" end="2"/>
+                                            </p:txEl>
+                                          </p:spTgt>
+                                        </p:tgtEl>
+                                        <p:attrNameLst>
+                                          <p:attrName>ppt_y</p:attrName>
+                                        </p:attrNameLst>
+                                      </p:cBhvr>
+                                      <p:tavLst>
+                                        <p:tav tm="0">
+                                          <p:val>
+                                            <p:strVal val="1+#ppt_h/2"/>
+                                          </p:val>
+                                        </p:tav>
+                                        <p:tav tm="100000">
+                                          <p:val>
+                                            <p:strVal val="#ppt_y"/>
+                                          </p:val>
+                                        </p:tav>
+                                      </p:tavLst>
+                                    </p:anim>
+                                  </p:childTnLst>
+                                </p:cTn>
+                              </p:par>
+                            </p:childTnLst>
+                          </p:cTn>
+                        </p:par>
+                      </p:childTnLst>
+                    </p:cTn>
+                  </p:par>
+                  <p:par>
+                    <p:cTn id="21" fill="hold">
+                      <p:stCondLst>
+                        <p:cond delay="indefinite"/>
+                      </p:stCondLst>
+                      <p:childTnLst>
+                        <p:par>
+                          <p:cTn id="22" fill="hold">
+                            <p:stCondLst>
+                              <p:cond delay="0"/>
+                            </p:stCondLst>
+                            <p:childTnLst>
+                              <p:par>
+                                <p:cTn id="23" presetID="2" presetClass="entr" presetSubtype="4" fill="hold" grpId="0" nodeType="clickEffect">
+                                  <p:stCondLst>
+                                    <p:cond delay="0"/>
+                                  </p:stCondLst>
+                                  <p:childTnLst>
+                                    <p:set>
+                                      <p:cBhvr>
+                                        <p:cTn id="24" dur="1" fill="hold">
+                                          <p:stCondLst>
+                                            <p:cond delay="0"/>
+                                          </p:stCondLst>
+                                        </p:cTn>
+                                        <p:tgtEl>
+                                          <p:spTgt spid="3">
+                                            <p:txEl>
+                                              <p:pRg st="3" end="3"/>
+                                            </p:txEl>
+                                          </p:spTgt>
+                                        </p:tgtEl>
+                                        <p:attrNameLst>
+                                          <p:attrName>style.visibility</p:attrName>
+                                        </p:attrNameLst>
+                                      </p:cBhvr>
+                                      <p:to>
+                                        <p:strVal val="visible"/>
+                                      </p:to>
+                                    </p:set>
+                                    <p:anim calcmode="lin" valueType="num">
+                                      <p:cBhvr additive="base">
+                                        <p:cTn id="25" dur="500" fill="hold"/>
+                                        <p:tgtEl>
+                                          <p:spTgt spid="3">
+                                            <p:txEl>
+                                              <p:pRg st="3" end="3"/>
+                                            </p:txEl>
+                                          </p:spTgt>
+                                        </p:tgtEl>
+                                        <p:attrNameLst>
+                                          <p:attrName>ppt_x</p:attrName>
+                                        </p:attrNameLst>
+                                      </p:cBhvr>
+                                      <p:tavLst>
+                                        <p:tav tm="0">
+                                          <p:val>
+                                            <p:strVal val="#ppt_x"/>
+                                          </p:val>
+                                        </p:tav>
+                                        <p:tav tm="100000">
+                                          <p:val>
+                                            <p:strVal val="#ppt_x"/>
+                                          </p:val>
+                                        </p:tav>
+                                      </p:tavLst>
+                                    </p:anim>
+                                    <p:anim calcmode="lin" valueType="num">
+                                      <p:cBhvr additive="base">
+                                        <p:cTn id="26" dur="500" fill="hold"/>
+                                        <p:tgtEl>
+                                          <p:spTgt spid="3">
+                                            <p:txEl>
+                                              <p:pRg st="3" end="3"/>
+                                            </p:txEl>
+                                          </p:spTgt>
+                                        </p:tgtEl>
+                                        <p:attrNameLst>
+                                          <p:attrName>ppt_y</p:attrName>
+                                        </p:attrNameLst>
+                                      </p:cBhvr>
+                                      <p:tavLst>
+                                        <p:tav tm="0">
+                                          <p:val>
+                                            <p:strVal val="1+#ppt_h/2"/>
+                                          </p:val>
+                                        </p:tav>
+                                        <p:tav tm="100000">
+                                          <p:val>
+                                            <p:strVal val="#ppt_y"/>
+                                          </p:val>
+                                        </p:tav>
+                                      </p:tavLst>
+                                    </p:anim>
+                                  </p:childTnLst>
+                                </p:cTn>
+                              </p:par>
+                            </p:childTnLst>
+                          </p:cTn>
+                        </p:par>
+                      </p:childTnLst>
+                    </p:cTn>
+                  </p:par>
+                </p:childTnLst>
+              </p:cTn>
+              <p:prevCondLst>
+                <p:cond evt="onPrev" delay="0">
+                  <p:tgtEl>
+                    <p:sldTgt/>
+                  </p:tgtEl>
+                </p:cond>
+              </p:prevCondLst>
+              <p:nextCondLst>
+                <p:cond evt="onNext" delay="0">
+                  <p:tgtEl>
+                    <p:sldTgt/>
+                  </p:tgtEl>
+                </p:cond>
+              </p:nextCondLst>
+            </p:seq>
+          </p:childTnLst>
+        </p:cTn>
+      </p:par>
+    </p:tnLst>
+    <p:bldLst>
+      <p:bldP spid="3" grpId="0" build="p"/>
+    </p:bldLst>
+  </p:timing>
+</p:sld>
+</file>
+
+<file path=ppt/slides/slide6.xml><?xml version="1.0" encoding="utf-8"?>
+<p:sld xmlns:a="http://schemas.openxmlformats.org/drawingml/2006/main" xmlns:r="http://schemas.openxmlformats.org/officeDocument/2006/relationships" xmlns:p="http://schemas.openxmlformats.org/presentationml/2006/main">
+  <p:cSld>
+    <p:bg>
+      <p:bgPr>
+        <a:solidFill>
+          <a:schemeClr val="bg1"/>
+        </a:solidFill>
+        <a:effectLst/>
+      </p:bgPr>
+    </p:bg>
+    <p:spTree>
+      <p:nvGrpSpPr>
+        <p:cNvPr id="1" name=""/>
+        <p:cNvGrpSpPr/>
+        <p:nvPr/>
+      </p:nvGrpSpPr>
+      <p:grpSpPr>
+        <a:xfrm>
+          <a:off x="0" y="0"/>
+          <a:ext cx="0" cy="0"/>
+          <a:chOff x="0" y="0"/>
+          <a:chExt cx="0" cy="0"/>
+        </a:xfrm>
+      </p:grpSpPr>
+      <p:sp>
+        <p:nvSpPr>
           <p:cNvPr id="8" name="Rectangle 7">
             <a:extLst>
               <a:ext uri="{FF2B5EF4-FFF2-40B4-BE49-F238E27FC236}">
@@ -7015,7 +8404,7 @@
 </p:sld>
 </file>
 
-<file path=ppt/slides/slide6.xml><?xml version="1.0" encoding="utf-8"?>
+<file path=ppt/slides/slide7.xml><?xml version="1.0" encoding="utf-8"?>
 <p:sld xmlns:a="http://schemas.openxmlformats.org/drawingml/2006/main" xmlns:r="http://schemas.openxmlformats.org/officeDocument/2006/relationships" xmlns:p="http://schemas.openxmlformats.org/presentationml/2006/main">
   <p:cSld>
     <p:bg>
@@ -7275,7 +8664,7 @@
 </p:sld>
 </file>
 
-<file path=ppt/slides/slide7.xml><?xml version="1.0" encoding="utf-8"?>
+<file path=ppt/slides/slide8.xml><?xml version="1.0" encoding="utf-8"?>
 <p:sld xmlns:a="http://schemas.openxmlformats.org/drawingml/2006/main" xmlns:r="http://schemas.openxmlformats.org/officeDocument/2006/relationships" xmlns:p="http://schemas.openxmlformats.org/presentationml/2006/main">
   <p:cSld>
     <p:bg>
@@ -7535,7 +8924,7 @@
 </p:sld>
 </file>
 
-<file path=ppt/slides/slide8.xml><?xml version="1.0" encoding="utf-8"?>
+<file path=ppt/slides/slide9.xml><?xml version="1.0" encoding="utf-8"?>
 <p:sld xmlns:a="http://schemas.openxmlformats.org/drawingml/2006/main" xmlns:r="http://schemas.openxmlformats.org/officeDocument/2006/relationships" xmlns:p="http://schemas.openxmlformats.org/presentationml/2006/main">
   <p:cSld>
     <p:bg>

</xml_diff>

<commit_message>
Add parallel pack and quick sort implementations.
</commit_message>
<xml_diff>
--- a/lecture-3/presentation-3.pptx
+++ b/lecture-3/presentation-3.pptx
@@ -205,7 +205,7 @@
           <a:p>
             <a:fld id="{E758746B-B0EA-CA41-BB8E-A8C6FE44757D}" type="datetimeFigureOut">
               <a:rPr lang="en-US"/>
-              <a:t>10/20/19</a:t>
+              <a:t>10/24/19</a:t>
             </a:fld>
             <a:endParaRPr lang="en-US" dirty="0"/>
           </a:p>
@@ -620,7 +620,7 @@
             <a:fld id="{B61BEF0D-F0BB-DE4B-95CE-6DB70DBA9567}" type="datetimeFigureOut">
               <a:rPr lang="en-US"/>
               <a:pPr/>
-              <a:t>10/20/19</a:t>
+              <a:t>10/24/19</a:t>
             </a:fld>
             <a:endParaRPr lang="en-US" dirty="0"/>
           </a:p>
@@ -832,7 +832,7 @@
             <a:fld id="{B61BEF0D-F0BB-DE4B-95CE-6DB70DBA9567}" type="datetimeFigureOut">
               <a:rPr lang="en-US"/>
               <a:pPr/>
-              <a:t>10/20/19</a:t>
+              <a:t>10/24/19</a:t>
             </a:fld>
             <a:endParaRPr lang="en-US" dirty="0"/>
           </a:p>
@@ -1054,7 +1054,7 @@
             <a:fld id="{B61BEF0D-F0BB-DE4B-95CE-6DB70DBA9567}" type="datetimeFigureOut">
               <a:rPr lang="en-US"/>
               <a:pPr/>
-              <a:t>10/20/19</a:t>
+              <a:t>10/24/19</a:t>
             </a:fld>
             <a:endParaRPr lang="en-US" dirty="0"/>
           </a:p>
@@ -1266,7 +1266,7 @@
             <a:fld id="{B61BEF0D-F0BB-DE4B-95CE-6DB70DBA9567}" type="datetimeFigureOut">
               <a:rPr lang="en-US"/>
               <a:pPr/>
-              <a:t>10/20/19</a:t>
+              <a:t>10/24/19</a:t>
             </a:fld>
             <a:endParaRPr lang="en-US" dirty="0"/>
           </a:p>
@@ -1555,7 +1555,7 @@
             <a:fld id="{B61BEF0D-F0BB-DE4B-95CE-6DB70DBA9567}" type="datetimeFigureOut">
               <a:rPr lang="en-US"/>
               <a:pPr/>
-              <a:t>10/20/19</a:t>
+              <a:t>10/24/19</a:t>
             </a:fld>
             <a:endParaRPr lang="en-US" dirty="0"/>
           </a:p>
@@ -1834,7 +1834,7 @@
             <a:fld id="{B61BEF0D-F0BB-DE4B-95CE-6DB70DBA9567}" type="datetimeFigureOut">
               <a:rPr lang="en-US"/>
               <a:pPr/>
-              <a:t>10/20/19</a:t>
+              <a:t>10/24/19</a:t>
             </a:fld>
             <a:endParaRPr lang="en-US" dirty="0"/>
           </a:p>
@@ -2260,7 +2260,7 @@
             <a:fld id="{B61BEF0D-F0BB-DE4B-95CE-6DB70DBA9567}" type="datetimeFigureOut">
               <a:rPr lang="en-US"/>
               <a:pPr/>
-              <a:t>10/20/19</a:t>
+              <a:t>10/24/19</a:t>
             </a:fld>
             <a:endParaRPr lang="en-US" dirty="0"/>
           </a:p>
@@ -2403,7 +2403,7 @@
             <a:fld id="{B61BEF0D-F0BB-DE4B-95CE-6DB70DBA9567}" type="datetimeFigureOut">
               <a:rPr lang="en-US"/>
               <a:pPr/>
-              <a:t>10/20/19</a:t>
+              <a:t>10/24/19</a:t>
             </a:fld>
             <a:endParaRPr lang="en-US" dirty="0"/>
           </a:p>
@@ -2530,7 +2530,7 @@
             <a:fld id="{B61BEF0D-F0BB-DE4B-95CE-6DB70DBA9567}" type="datetimeFigureOut">
               <a:rPr lang="en-US"/>
               <a:pPr/>
-              <a:t>10/20/19</a:t>
+              <a:t>10/24/19</a:t>
             </a:fld>
             <a:endParaRPr lang="en-US" dirty="0"/>
           </a:p>
@@ -2855,7 +2855,7 @@
             <a:fld id="{B61BEF0D-F0BB-DE4B-95CE-6DB70DBA9567}" type="datetimeFigureOut">
               <a:rPr lang="en-US"/>
               <a:pPr/>
-              <a:t>10/20/19</a:t>
+              <a:t>10/24/19</a:t>
             </a:fld>
             <a:endParaRPr lang="en-US" dirty="0"/>
           </a:p>
@@ -3157,7 +3157,7 @@
             <a:fld id="{B61BEF0D-F0BB-DE4B-95CE-6DB70DBA9567}" type="datetimeFigureOut">
               <a:rPr lang="en-US"/>
               <a:pPr/>
-              <a:t>10/20/19</a:t>
+              <a:t>10/24/19</a:t>
             </a:fld>
             <a:endParaRPr lang="en-US" dirty="0"/>
           </a:p>
@@ -3412,7 +3412,7 @@
             <a:fld id="{B61BEF0D-F0BB-DE4B-95CE-6DB70DBA9567}" type="datetimeFigureOut">
               <a:rPr lang="en-US"/>
               <a:pPr/>
-              <a:t>10/20/19</a:t>
+              <a:t>10/24/19</a:t>
             </a:fld>
             <a:endParaRPr lang="en-US" dirty="0"/>
           </a:p>
@@ -5626,114 +5626,114 @@
           <a:lstStyle/>
           <a:p>
             <a:r>
-              <a:rPr lang="en-US" sz="2400" dirty="0">
+              <a:rPr lang="en-US" sz="2400" dirty="0" err="1">
                 <a:latin typeface="Courier New" panose="02070309020205020404" pitchFamily="49" charset="0"/>
                 <a:cs typeface="Courier New" panose="02070309020205020404" pitchFamily="49" charset="0"/>
               </a:rPr>
               <a:t>SerialPrimes</a:t>
             </a:r>
             <a:r>
-              <a:rPr lang="en-US" sz="2400" dirty="0"/>
+              <a:rPr lang="en-US" sz="2400"/>
               <a:t> is the brute-force solution that serves as a baseline</a:t>
             </a:r>
           </a:p>
           <a:p>
             <a:r>
-              <a:rPr lang="en-US" sz="2400" dirty="0">
+              <a:rPr lang="en-US" sz="2400">
                 <a:latin typeface="Courier New" panose="02070309020205020404" pitchFamily="49" charset="0"/>
                 <a:cs typeface="Courier New" panose="02070309020205020404" pitchFamily="49" charset="0"/>
               </a:rPr>
               <a:t>ThreadedPrimesWrongV1</a:t>
             </a:r>
             <a:r>
-              <a:rPr lang="en-US" sz="2400" dirty="0"/>
+              <a:rPr lang="en-US" sz="2400"/>
               <a:t> is the first attempt to create a multi-threaded version</a:t>
             </a:r>
           </a:p>
           <a:p>
             <a:r>
-              <a:rPr lang="en-US" sz="2400" dirty="0">
+              <a:rPr lang="en-US" sz="2400">
                 <a:latin typeface="Courier New" panose="02070309020205020404" pitchFamily="49" charset="0"/>
                 <a:cs typeface="Courier New" panose="02070309020205020404" pitchFamily="49" charset="0"/>
               </a:rPr>
               <a:t>ThreadedPrimesWrongV2</a:t>
             </a:r>
             <a:r>
-              <a:rPr lang="en-US" sz="2400" dirty="0"/>
+              <a:rPr lang="en-US" sz="2400"/>
               <a:t> is the second attempt to create a multi-threaded version</a:t>
             </a:r>
           </a:p>
           <a:p>
             <a:r>
-              <a:rPr lang="en-US" sz="2400" dirty="0">
+              <a:rPr lang="en-US" sz="2400">
                 <a:latin typeface="Courier New" panose="02070309020205020404" pitchFamily="49" charset="0"/>
                 <a:cs typeface="Courier New" panose="02070309020205020404" pitchFamily="49" charset="0"/>
               </a:rPr>
               <a:t>ThreadedPrimesFixed</a:t>
             </a:r>
             <a:r>
-              <a:rPr lang="en-US" sz="2400" dirty="0"/>
+              <a:rPr lang="en-US" sz="2400"/>
               <a:t> is the correct way to create a multi-threaded version. Demonstrates the techniques of </a:t>
             </a:r>
             <a:r>
-              <a:rPr lang="en-US" sz="2400" i="1" dirty="0"/>
+              <a:rPr lang="en-US" sz="2400" i="1"/>
               <a:t>privatization of variables</a:t>
             </a:r>
             <a:r>
-              <a:rPr lang="en-US" sz="2400" dirty="0"/>
+              <a:rPr lang="en-US" sz="2400"/>
               <a:t> and </a:t>
             </a:r>
             <a:r>
-              <a:rPr lang="en-US" sz="2400" i="1" dirty="0"/>
+              <a:rPr lang="en-US" sz="2400" i="1"/>
               <a:t>load balancing</a:t>
             </a:r>
             <a:r>
-              <a:rPr lang="en-US" sz="2400" dirty="0"/>
+              <a:rPr lang="en-US" sz="2400"/>
               <a:t>.</a:t>
             </a:r>
           </a:p>
           <a:p>
             <a:r>
-              <a:rPr lang="en-US" sz="2400" dirty="0"/>
+              <a:rPr lang="en-US" sz="2400"/>
               <a:t>There is no perfect load balancing as we would need to know the distribution of primes among integers (Riemann’s hypothesis).</a:t>
             </a:r>
           </a:p>
           <a:p>
             <a:r>
-              <a:rPr lang="en-US" sz="2400" dirty="0">
+              <a:rPr lang="en-US" sz="2400">
                 <a:latin typeface="Courier New" panose="02070309020205020404" pitchFamily="49" charset="0"/>
                 <a:cs typeface="Courier New" panose="02070309020205020404" pitchFamily="49" charset="0"/>
               </a:rPr>
               <a:t>FastSerialPrimes</a:t>
             </a:r>
             <a:r>
-              <a:rPr lang="en-US" sz="2400" dirty="0"/>
+              <a:rPr lang="en-US" sz="2400"/>
               <a:t> is a huge improvement that avoids threads</a:t>
             </a:r>
           </a:p>
           <a:p>
             <a:r>
-              <a:rPr lang="en-US" sz="2400" dirty="0">
+              <a:rPr lang="en-US" sz="2400">
                 <a:latin typeface="Courier New" panose="02070309020205020404" pitchFamily="49" charset="0"/>
                 <a:cs typeface="Courier New" panose="02070309020205020404" pitchFamily="49" charset="0"/>
               </a:rPr>
               <a:t>FastThreadedPrimes</a:t>
             </a:r>
             <a:r>
-              <a:rPr lang="en-US" sz="2400" dirty="0"/>
+              <a:rPr lang="en-US" sz="2400"/>
               <a:t> is a another lift with threads over the previous variant</a:t>
             </a:r>
           </a:p>
           <a:p>
             <a:r>
-              <a:rPr lang="en-US" sz="2400" dirty="0">
+              <a:rPr lang="en-US" sz="2400">
                 <a:latin typeface="Courier New" panose="02070309020205020404" pitchFamily="49" charset="0"/>
                 <a:cs typeface="Courier New" panose="02070309020205020404" pitchFamily="49" charset="0"/>
               </a:rPr>
               <a:t>Sieve</a:t>
             </a:r>
             <a:r>
-              <a:rPr lang="en-US" sz="2400" dirty="0"/>
+              <a:rPr lang="en-US" sz="2400"/>
               <a:t> is an ultimate serial version</a:t>
             </a:r>
           </a:p>
@@ -7058,7 +7058,7 @@
             </p:spPr>
             <p:txBody>
               <a:bodyPr vert="horz" lIns="91440" tIns="45720" rIns="91440" bIns="45720" rtlCol="0" anchor="ctr">
-                <a:normAutofit/>
+                <a:normAutofit fontScale="92500" lnSpcReduction="10000"/>
               </a:bodyPr>
               <a:lstStyle/>
               <a:p>
@@ -7308,14 +7308,34 @@
                   <a:buNone/>
                 </a:pPr>
                 <a:r>
-                  <a:rPr lang="en-US" sz="2000" b="0" kern="1200">
+                  <a:rPr lang="en-US" sz="2000" b="0" kern="1200" dirty="0">
                     <a:solidFill>
                       <a:srgbClr val="000000"/>
                     </a:solidFill>
                     <a:ea typeface="+mn-ea"/>
                     <a:cs typeface="+mn-cs"/>
                   </a:rPr>
-                  <a:t>Parallel prefix sum (implementation from scratch)</a:t>
+                  <a:t>Parallel </a:t>
+                </a:r>
+                <a:r>
+                  <a:rPr lang="en-US" sz="2000" b="0" i="1" kern="1200" dirty="0">
+                    <a:solidFill>
+                      <a:srgbClr val="000000"/>
+                    </a:solidFill>
+                    <a:ea typeface="+mn-ea"/>
+                    <a:cs typeface="+mn-cs"/>
+                  </a:rPr>
+                  <a:t>prefix sum</a:t>
+                </a:r>
+                <a:r>
+                  <a:rPr lang="en-US" sz="2000" b="0" kern="1200" dirty="0">
+                    <a:solidFill>
+                      <a:srgbClr val="000000"/>
+                    </a:solidFill>
+                    <a:ea typeface="+mn-ea"/>
+                    <a:cs typeface="+mn-cs"/>
+                  </a:rPr>
+                  <a:t> (implementation from scratch)</a:t>
                 </a:r>
               </a:p>
               <a:p>
@@ -7323,15 +7343,31 @@
                   <a:buNone/>
                 </a:pPr>
                 <a:r>
-                  <a:rPr lang="en-US" sz="2000">
+                  <a:rPr lang="en-US" sz="2000" dirty="0">
                     <a:solidFill>
                       <a:srgbClr val="000000"/>
                     </a:solidFill>
                   </a:rPr>
-                  <a:t>Parallel pack operation using the built-in Java SE 8 </a:t>
+                  <a:t>Parallel </a:t>
                 </a:r>
                 <a:r>
-                  <a:rPr lang="en-US" sz="1600">
+                  <a:rPr lang="en-US" sz="2000" i="1" dirty="0">
+                    <a:solidFill>
+                      <a:srgbClr val="000000"/>
+                    </a:solidFill>
+                  </a:rPr>
+                  <a:t>pack</a:t>
+                </a:r>
+                <a:r>
+                  <a:rPr lang="en-US" sz="2000" dirty="0">
+                    <a:solidFill>
+                      <a:srgbClr val="000000"/>
+                    </a:solidFill>
+                  </a:rPr>
+                  <a:t> implementation with the built-in Java SE 8 </a:t>
+                </a:r>
+                <a:r>
+                  <a:rPr lang="en-US" sz="1600" dirty="0">
                     <a:solidFill>
                       <a:srgbClr val="000000"/>
                     </a:solidFill>
@@ -7340,28 +7376,76 @@
                   </a:rPr>
                   <a:t>java.util.Arrays.parallelPrefix</a:t>
                 </a:r>
-                <a:endParaRPr lang="en-US" sz="1600" b="0" kern="1200">
-                  <a:solidFill>
-                    <a:srgbClr val="000000"/>
-                  </a:solidFill>
-                  <a:latin typeface="Courier New" panose="02070309020205020404" pitchFamily="49" charset="0"/>
-                  <a:cs typeface="Courier New" panose="02070309020205020404" pitchFamily="49" charset="0"/>
-                </a:endParaRPr>
+                <a:r>
+                  <a:rPr lang="en-US" sz="2000" dirty="0">
+                    <a:solidFill>
+                      <a:srgbClr val="000000"/>
+                    </a:solidFill>
+                  </a:rPr>
+                  <a:t> and </a:t>
+                </a:r>
+                <a:r>
+                  <a:rPr lang="en-US" sz="1600" dirty="0">
+                    <a:solidFill>
+                      <a:srgbClr val="000000"/>
+                    </a:solidFill>
+                    <a:latin typeface="Courier New" panose="02070309020205020404" pitchFamily="49" charset="0"/>
+                    <a:cs typeface="Courier New" panose="02070309020205020404" pitchFamily="49" charset="0"/>
+                  </a:rPr>
+                  <a:t>java.util.parallelSetAll</a:t>
+                </a:r>
+                <a:r>
+                  <a:rPr lang="en-US" sz="2000" dirty="0">
+                    <a:solidFill>
+                      <a:srgbClr val="000000"/>
+                    </a:solidFill>
+                  </a:rPr>
+                  <a:t>  methods</a:t>
+                </a:r>
               </a:p>
               <a:p>
                 <a:pPr marL="0" indent="0">
                   <a:buNone/>
                 </a:pPr>
                 <a:r>
-                  <a:rPr lang="en-US" sz="2000">
+                  <a:rPr lang="en-US" sz="2000" dirty="0">
                     <a:solidFill>
                       <a:srgbClr val="000000"/>
                     </a:solidFill>
                   </a:rPr>
-                  <a:t>Parallel quick-sort using parallel prefix sum and packing (again you already have this in </a:t>
+                  <a:t>Parallel quick sort implementation that builds upon parallel prefix sum and packing algorithms (provided as a test case for the </a:t>
                 </a:r>
                 <a:r>
-                  <a:rPr lang="en-US" sz="1600">
+                  <a:rPr lang="en-US" sz="2000" i="1" dirty="0">
+                    <a:solidFill>
+                      <a:srgbClr val="000000"/>
+                    </a:solidFill>
+                  </a:rPr>
+                  <a:t>pack</a:t>
+                </a:r>
+                <a:r>
+                  <a:rPr lang="en-US" sz="2000" dirty="0">
+                    <a:solidFill>
+                      <a:srgbClr val="000000"/>
+                    </a:solidFill>
+                  </a:rPr>
+                  <a:t> algorithm)</a:t>
+                </a:r>
+              </a:p>
+              <a:p>
+                <a:pPr marL="0" indent="0">
+                  <a:buNone/>
+                </a:pPr>
+                <a:r>
+                  <a:rPr lang="en-US" sz="2000" dirty="0">
+                    <a:solidFill>
+                      <a:srgbClr val="000000"/>
+                    </a:solidFill>
+                  </a:rPr>
+                  <a:t>Parallel merge sort delivered as part of Java SE 8 (see </a:t>
+                </a:r>
+                <a:r>
+                  <a:rPr lang="en-US" sz="1600" dirty="0">
                     <a:solidFill>
                       <a:srgbClr val="000000"/>
                     </a:solidFill>
@@ -7371,12 +7455,12 @@
                   <a:t>java.util.Arrays.parallelSort</a:t>
                 </a:r>
                 <a:r>
-                  <a:rPr lang="en-US" sz="2000">
+                  <a:rPr lang="en-US" sz="2000" dirty="0">
                     <a:solidFill>
                       <a:srgbClr val="000000"/>
                     </a:solidFill>
                   </a:rPr>
-                  <a:t>).</a:t>
+                  <a:t>)</a:t>
                 </a:r>
               </a:p>
             </p:txBody>
@@ -7407,7 +7491,7 @@
               <a:blipFill>
                 <a:blip r:embed="rId5"/>
                 <a:stretch>
-                  <a:fillRect l="-1531"/>
+                  <a:fillRect l="-1276" r="-255"/>
                 </a:stretch>
               </a:blipFill>
             </p:spPr>
@@ -7839,6 +7923,109 @@
                                           <p:spTgt spid="3">
                                             <p:txEl>
                                               <p:pRg st="3" end="3"/>
+                                            </p:txEl>
+                                          </p:spTgt>
+                                        </p:tgtEl>
+                                        <p:attrNameLst>
+                                          <p:attrName>ppt_y</p:attrName>
+                                        </p:attrNameLst>
+                                      </p:cBhvr>
+                                      <p:tavLst>
+                                        <p:tav tm="0">
+                                          <p:val>
+                                            <p:strVal val="1+#ppt_h/2"/>
+                                          </p:val>
+                                        </p:tav>
+                                        <p:tav tm="100000">
+                                          <p:val>
+                                            <p:strVal val="#ppt_y"/>
+                                          </p:val>
+                                        </p:tav>
+                                      </p:tavLst>
+                                    </p:anim>
+                                  </p:childTnLst>
+                                </p:cTn>
+                              </p:par>
+                            </p:childTnLst>
+                          </p:cTn>
+                        </p:par>
+                      </p:childTnLst>
+                    </p:cTn>
+                  </p:par>
+                  <p:par>
+                    <p:cTn id="27" fill="hold">
+                      <p:stCondLst>
+                        <p:cond delay="indefinite"/>
+                      </p:stCondLst>
+                      <p:childTnLst>
+                        <p:par>
+                          <p:cTn id="28" fill="hold">
+                            <p:stCondLst>
+                              <p:cond delay="0"/>
+                            </p:stCondLst>
+                            <p:childTnLst>
+                              <p:par>
+                                <p:cTn id="29" presetID="2" presetClass="entr" presetSubtype="4" fill="hold" grpId="0" nodeType="clickEffect">
+                                  <p:stCondLst>
+                                    <p:cond delay="0"/>
+                                  </p:stCondLst>
+                                  <p:childTnLst>
+                                    <p:set>
+                                      <p:cBhvr>
+                                        <p:cTn id="30" dur="1" fill="hold">
+                                          <p:stCondLst>
+                                            <p:cond delay="0"/>
+                                          </p:stCondLst>
+                                        </p:cTn>
+                                        <p:tgtEl>
+                                          <p:spTgt spid="3">
+                                            <p:txEl>
+                                              <p:pRg st="4" end="4"/>
+                                            </p:txEl>
+                                          </p:spTgt>
+                                        </p:tgtEl>
+                                        <p:attrNameLst>
+                                          <p:attrName>style.visibility</p:attrName>
+                                        </p:attrNameLst>
+                                      </p:cBhvr>
+                                      <p:to>
+                                        <p:strVal val="visible"/>
+                                      </p:to>
+                                    </p:set>
+                                    <p:anim calcmode="lin" valueType="num">
+                                      <p:cBhvr additive="base">
+                                        <p:cTn id="31" dur="500" fill="hold"/>
+                                        <p:tgtEl>
+                                          <p:spTgt spid="3">
+                                            <p:txEl>
+                                              <p:pRg st="4" end="4"/>
+                                            </p:txEl>
+                                          </p:spTgt>
+                                        </p:tgtEl>
+                                        <p:attrNameLst>
+                                          <p:attrName>ppt_x</p:attrName>
+                                        </p:attrNameLst>
+                                      </p:cBhvr>
+                                      <p:tavLst>
+                                        <p:tav tm="0">
+                                          <p:val>
+                                            <p:strVal val="#ppt_x"/>
+                                          </p:val>
+                                        </p:tav>
+                                        <p:tav tm="100000">
+                                          <p:val>
+                                            <p:strVal val="#ppt_x"/>
+                                          </p:val>
+                                        </p:tav>
+                                      </p:tavLst>
+                                    </p:anim>
+                                    <p:anim calcmode="lin" valueType="num">
+                                      <p:cBhvr additive="base">
+                                        <p:cTn id="32" dur="500" fill="hold"/>
+                                        <p:tgtEl>
+                                          <p:spTgt spid="3">
+                                            <p:txEl>
+                                              <p:pRg st="4" end="4"/>
                                             </p:txEl>
                                           </p:spTgt>
                                         </p:tgtEl>

</xml_diff>